<commit_message>
Updated the ASP.NET MVC slide deck
</commit_message>
<xml_diff>
--- a/Intro to F# and ASP.NET MVC.pptx
+++ b/Intro to F# and ASP.NET MVC.pptx
@@ -114,7 +114,7 @@
   </p:defaultTextStyle>
   <p:extLst>
     <p:ext uri="{EFAFB233-063F-42B5-8137-9DF3F51BA10A}">
-      <p15:sldGuideLst xmlns="" xmlns:p15="http://schemas.microsoft.com/office/powerpoint/2012/main">
+      <p15:sldGuideLst xmlns:p15="http://schemas.microsoft.com/office/powerpoint/2012/main" xmlns="">
         <p15:guide id="1" orient="horz" pos="2160">
           <p15:clr>
             <a:srgbClr val="A4A3A4"/>
@@ -7535,7 +7535,7 @@
         </p:spPr>
         <p:txBody>
           <a:bodyPr>
-            <a:normAutofit/>
+            <a:normAutofit fontScale="92500" lnSpcReduction="10000"/>
           </a:bodyPr>
           <a:lstStyle/>
           <a:p>
@@ -7579,8 +7579,19 @@
           <a:p>
             <a:r>
               <a:rPr lang="en-US" sz="2800" dirty="0" smtClean="0"/>
-              <a:t>Pattern Matching</a:t>
-            </a:r>
+              <a:t>Pattern </a:t>
+            </a:r>
+            <a:r>
+              <a:rPr lang="en-US" sz="2800" dirty="0" smtClean="0"/>
+              <a:t>Matching</a:t>
+            </a:r>
+          </a:p>
+          <a:p>
+            <a:r>
+              <a:rPr lang="en-US" sz="2800" dirty="0" smtClean="0"/>
+              <a:t>Units of Measure</a:t>
+            </a:r>
+            <a:endParaRPr lang="en-US" sz="2800" dirty="0" smtClean="0"/>
           </a:p>
           <a:p>
             <a:r>
@@ -8326,11 +8337,7 @@
           <a:p>
             <a:r>
               <a:rPr lang="en-US" sz="2800" dirty="0" smtClean="0"/>
-              <a:t>Your </a:t>
-            </a:r>
-            <a:r>
-              <a:rPr lang="en-US" sz="2800" dirty="0" smtClean="0"/>
-              <a:t>Turn</a:t>
+              <a:t>Your Turn</a:t>
             </a:r>
             <a:endParaRPr lang="en-US" sz="2800" b="1" dirty="0" smtClean="0"/>
           </a:p>
@@ -8659,7 +8666,7 @@
   <a:extraClrSchemeLst/>
   <a:extLst>
     <a:ext uri="{05A4C25C-085E-4340-85A3-A5531E510DB2}">
-      <thm15:themeFamily xmlns="" xmlns:thm15="http://schemas.microsoft.com/office/thememl/2012/main" name="Ion" id="{B8441ADB-2E43-4AF7-B97A-BD870242C6A8}" vid="{BACC050B-8757-4460-95D8-E37B46A6B421}"/>
+      <thm15:themeFamily xmlns:thm15="http://schemas.microsoft.com/office/thememl/2012/main" xmlns="" name="Ion" id="{B8441ADB-2E43-4AF7-B97A-BD870242C6A8}" vid="{BACC050B-8757-4460-95D8-E37B46A6B421}"/>
     </a:ext>
   </a:extLst>
 </a:theme>

</xml_diff>